<commit_message>
fix a few small typos...
</commit_message>
<xml_diff>
--- a/classes/stats2015/Lecture7.pptx
+++ b/classes/stats2015/Lecture7.pptx
@@ -231,7 +231,7 @@
             <a:fld id="{EED6FE97-C8F6-414A-BAD9-185DD18CF7E9}" type="datetimeFigureOut">
               <a:rPr lang="en-US" smtClean="0"/>
               <a:pPr/>
-              <a:t>2/5/2015</a:t>
+              <a:t>2/8/2015</a:t>
             </a:fld>
             <a:endParaRPr lang="en-US"/>
           </a:p>
@@ -3877,7 +3877,7 @@
             <a:fld id="{1D8BD707-D9CF-40AE-B4C6-C98DA3205C09}" type="datetimeFigureOut">
               <a:rPr lang="en-US" smtClean="0"/>
               <a:pPr/>
-              <a:t>2/5/2015</a:t>
+              <a:t>2/8/2015</a:t>
             </a:fld>
             <a:endParaRPr lang="en-US"/>
           </a:p>
@@ -4044,7 +4044,7 @@
             <a:fld id="{1D8BD707-D9CF-40AE-B4C6-C98DA3205C09}" type="datetimeFigureOut">
               <a:rPr lang="en-US" smtClean="0"/>
               <a:pPr/>
-              <a:t>2/5/2015</a:t>
+              <a:t>2/8/2015</a:t>
             </a:fld>
             <a:endParaRPr lang="en-US"/>
           </a:p>
@@ -4221,7 +4221,7 @@
             <a:fld id="{1D8BD707-D9CF-40AE-B4C6-C98DA3205C09}" type="datetimeFigureOut">
               <a:rPr lang="en-US" smtClean="0"/>
               <a:pPr/>
-              <a:t>2/5/2015</a:t>
+              <a:t>2/8/2015</a:t>
             </a:fld>
             <a:endParaRPr lang="en-US"/>
           </a:p>
@@ -4388,7 +4388,7 @@
             <a:fld id="{1D8BD707-D9CF-40AE-B4C6-C98DA3205C09}" type="datetimeFigureOut">
               <a:rPr lang="en-US" smtClean="0"/>
               <a:pPr/>
-              <a:t>2/5/2015</a:t>
+              <a:t>2/8/2015</a:t>
             </a:fld>
             <a:endParaRPr lang="en-US"/>
           </a:p>
@@ -4631,7 +4631,7 @@
             <a:fld id="{1D8BD707-D9CF-40AE-B4C6-C98DA3205C09}" type="datetimeFigureOut">
               <a:rPr lang="en-US" smtClean="0"/>
               <a:pPr/>
-              <a:t>2/5/2015</a:t>
+              <a:t>2/8/2015</a:t>
             </a:fld>
             <a:endParaRPr lang="en-US"/>
           </a:p>
@@ -4916,7 +4916,7 @@
             <a:fld id="{1D8BD707-D9CF-40AE-B4C6-C98DA3205C09}" type="datetimeFigureOut">
               <a:rPr lang="en-US" smtClean="0"/>
               <a:pPr/>
-              <a:t>2/5/2015</a:t>
+              <a:t>2/8/2015</a:t>
             </a:fld>
             <a:endParaRPr lang="en-US"/>
           </a:p>
@@ -5335,7 +5335,7 @@
             <a:fld id="{1D8BD707-D9CF-40AE-B4C6-C98DA3205C09}" type="datetimeFigureOut">
               <a:rPr lang="en-US" smtClean="0"/>
               <a:pPr/>
-              <a:t>2/5/2015</a:t>
+              <a:t>2/8/2015</a:t>
             </a:fld>
             <a:endParaRPr lang="en-US"/>
           </a:p>
@@ -5450,7 +5450,7 @@
             <a:fld id="{1D8BD707-D9CF-40AE-B4C6-C98DA3205C09}" type="datetimeFigureOut">
               <a:rPr lang="en-US" smtClean="0"/>
               <a:pPr/>
-              <a:t>2/5/2015</a:t>
+              <a:t>2/8/2015</a:t>
             </a:fld>
             <a:endParaRPr lang="en-US"/>
           </a:p>
@@ -5542,7 +5542,7 @@
             <a:fld id="{1D8BD707-D9CF-40AE-B4C6-C98DA3205C09}" type="datetimeFigureOut">
               <a:rPr lang="en-US" smtClean="0"/>
               <a:pPr/>
-              <a:t>2/5/2015</a:t>
+              <a:t>2/8/2015</a:t>
             </a:fld>
             <a:endParaRPr lang="en-US"/>
           </a:p>
@@ -5816,7 +5816,7 @@
             <a:fld id="{1D8BD707-D9CF-40AE-B4C6-C98DA3205C09}" type="datetimeFigureOut">
               <a:rPr lang="en-US" smtClean="0"/>
               <a:pPr/>
-              <a:t>2/5/2015</a:t>
+              <a:t>2/8/2015</a:t>
             </a:fld>
             <a:endParaRPr lang="en-US"/>
           </a:p>
@@ -6066,7 +6066,7 @@
             <a:fld id="{1D8BD707-D9CF-40AE-B4C6-C98DA3205C09}" type="datetimeFigureOut">
               <a:rPr lang="en-US" smtClean="0"/>
               <a:pPr/>
-              <a:t>2/5/2015</a:t>
+              <a:t>2/8/2015</a:t>
             </a:fld>
             <a:endParaRPr lang="en-US"/>
           </a:p>
@@ -6276,7 +6276,7 @@
             <a:fld id="{1D8BD707-D9CF-40AE-B4C6-C98DA3205C09}" type="datetimeFigureOut">
               <a:rPr lang="en-US" smtClean="0"/>
               <a:pPr/>
-              <a:t>2/5/2015</a:t>
+              <a:t>2/8/2015</a:t>
             </a:fld>
             <a:endParaRPr lang="en-US"/>
           </a:p>
@@ -7350,7 +7350,19 @@
           <a:p>
             <a:r>
               <a:rPr lang="en-US" dirty="0" smtClean="0"/>
-              <a:t>An example of the hypermetric distribution from the genomics literature:</a:t>
+              <a:t>An example of the </a:t>
+            </a:r>
+            <a:r>
+              <a:rPr lang="en-US" dirty="0" err="1" smtClean="0"/>
+              <a:t>hypergeometric</a:t>
+            </a:r>
+            <a:r>
+              <a:rPr lang="en-US" dirty="0" smtClean="0"/>
+              <a:t> </a:t>
+            </a:r>
+            <a:r>
+              <a:rPr lang="en-US" dirty="0" smtClean="0"/>
+              <a:t>distribution from the genomics literature:</a:t>
             </a:r>
           </a:p>
           <a:p>
@@ -7442,7 +7454,19 @@
           <a:p>
             <a:r>
               <a:rPr lang="en-US" dirty="0" smtClean="0"/>
-              <a:t>An example of the hypermetric distribution from the genomics literature:</a:t>
+              <a:t>An example of the </a:t>
+            </a:r>
+            <a:r>
+              <a:rPr lang="en-US" dirty="0" err="1" smtClean="0"/>
+              <a:t>hypergeometric</a:t>
+            </a:r>
+            <a:r>
+              <a:rPr lang="en-US" dirty="0" smtClean="0"/>
+              <a:t> </a:t>
+            </a:r>
+            <a:r>
+              <a:rPr lang="en-US" dirty="0" smtClean="0"/>
+              <a:t>distribution from the genomics literature:</a:t>
             </a:r>
           </a:p>
           <a:p>
@@ -8048,7 +8072,7 @@
         <p:spPr>
           <a:xfrm>
             <a:off x="304800" y="4800600"/>
-            <a:ext cx="3710952" cy="646331"/>
+            <a:ext cx="3676199" cy="646331"/>
           </a:xfrm>
           <a:prstGeom prst="rect">
             <a:avLst/>
@@ -8063,7 +8087,15 @@
           <a:p>
             <a:r>
               <a:rPr lang="en-US" dirty="0" smtClean="0"/>
-              <a:t>If a gene is assigned to a given gene it</a:t>
+              <a:t>If a </a:t>
+            </a:r>
+            <a:r>
+              <a:rPr lang="en-US" dirty="0" smtClean="0"/>
+              <a:t>read is </a:t>
+            </a:r>
+            <a:r>
+              <a:rPr lang="en-US" dirty="0" smtClean="0"/>
+              <a:t>assigned to a given gene it</a:t>
             </a:r>
           </a:p>
           <a:p>
@@ -8072,8 +8104,8 @@
               <a:t>is marked – </a:t>
             </a:r>
             <a:r>
-              <a:rPr lang="en-US" dirty="0" err="1" smtClean="0"/>
-              <a:t>consier</a:t>
+              <a:rPr lang="en-US" dirty="0" smtClean="0"/>
+              <a:t>consider</a:t>
             </a:r>
             <a:r>
               <a:rPr lang="en-US" dirty="0" smtClean="0"/>
@@ -8830,6 +8862,73 @@
           </a:p>
         </p:txBody>
       </p:sp>
+      <p:cxnSp>
+        <p:nvCxnSpPr>
+          <p:cNvPr id="9" name="Straight Arrow Connector 8"/>
+          <p:cNvCxnSpPr/>
+          <p:nvPr/>
+        </p:nvCxnSpPr>
+        <p:spPr>
+          <a:xfrm flipV="1">
+            <a:off x="3505200" y="4343400"/>
+            <a:ext cx="533400" cy="228600"/>
+          </a:xfrm>
+          <a:prstGeom prst="straightConnector1">
+            <a:avLst/>
+          </a:prstGeom>
+          <a:ln>
+            <a:tailEnd type="arrow"/>
+          </a:ln>
+        </p:spPr>
+        <p:style>
+          <a:lnRef idx="1">
+            <a:schemeClr val="accent1"/>
+          </a:lnRef>
+          <a:fillRef idx="0">
+            <a:schemeClr val="accent1"/>
+          </a:fillRef>
+          <a:effectRef idx="0">
+            <a:schemeClr val="accent1"/>
+          </a:effectRef>
+          <a:fontRef idx="minor">
+            <a:schemeClr val="tx1"/>
+          </a:fontRef>
+        </p:style>
+      </p:cxnSp>
+      <p:sp>
+        <p:nvSpPr>
+          <p:cNvPr id="10" name="TextBox 9"/>
+          <p:cNvSpPr txBox="1"/>
+          <p:nvPr/>
+        </p:nvSpPr>
+        <p:spPr>
+          <a:xfrm>
+            <a:off x="1066800" y="4495800"/>
+            <a:ext cx="2656305" cy="369332"/>
+          </a:xfrm>
+          <a:prstGeom prst="rect">
+            <a:avLst/>
+          </a:prstGeom>
+          <a:noFill/>
+        </p:spPr>
+        <p:txBody>
+          <a:bodyPr wrap="none" rtlCol="0">
+            <a:spAutoFit/>
+          </a:bodyPr>
+          <a:lstStyle/>
+          <a:p>
+            <a:r>
+              <a:rPr lang="en-US" dirty="0" smtClean="0"/>
+              <a:t>Make this a </a:t>
+            </a:r>
+            <a:r>
+              <a:rPr lang="en-US" smtClean="0"/>
+              <a:t>two-sided test</a:t>
+            </a:r>
+            <a:endParaRPr lang="en-US"/>
+          </a:p>
+        </p:txBody>
+      </p:sp>
     </p:spTree>
   </p:cSld>
   <p:clrMapOvr>
@@ -9010,23 +9109,7 @@
           <a:p>
             <a:r>
               <a:rPr lang="en-US" sz="1700" dirty="0" smtClean="0"/>
-              <a:t>Despite </a:t>
-            </a:r>
-            <a:r>
-              <a:rPr lang="en-US" sz="1700" dirty="0" smtClean="0"/>
-              <a:t>the lack of correction for </a:t>
-            </a:r>
-            <a:r>
-              <a:rPr lang="en-US" sz="1700" dirty="0" smtClean="0"/>
-              <a:t>the conservative nature of the Fisher test, </a:t>
-            </a:r>
-            <a:r>
-              <a:rPr lang="en-US" sz="1700" dirty="0" smtClean="0"/>
-              <a:t>it </a:t>
-            </a:r>
-            <a:r>
-              <a:rPr lang="en-US" sz="1700" dirty="0" smtClean="0"/>
-              <a:t>is reasonably close…</a:t>
+              <a:t>Despite the lack of correction for the conservative nature of the Fisher test, it is reasonably close…</a:t>
             </a:r>
             <a:endParaRPr lang="en-US" sz="1700" dirty="0"/>
           </a:p>
@@ -10977,7 +11060,15 @@
           <a:p>
             <a:r>
               <a:rPr lang="en-US" dirty="0" smtClean="0"/>
-              <a:t>	This is the same problem as for the cards…</a:t>
+              <a:t>	This is </a:t>
+            </a:r>
+            <a:r>
+              <a:rPr lang="en-US" dirty="0" smtClean="0"/>
+              <a:t>(almost) the </a:t>
+            </a:r>
+            <a:r>
+              <a:rPr lang="en-US" dirty="0" smtClean="0"/>
+              <a:t>same problem as for the cards…</a:t>
             </a:r>
           </a:p>
           <a:p>
@@ -11112,7 +11203,15 @@
           <a:p>
             <a:r>
               <a:rPr lang="en-US" dirty="0" smtClean="0"/>
-              <a:t>	This is the same problem as for the cards…</a:t>
+              <a:t>	This is </a:t>
+            </a:r>
+            <a:r>
+              <a:rPr lang="en-US" dirty="0" smtClean="0"/>
+              <a:t>(almost) the </a:t>
+            </a:r>
+            <a:r>
+              <a:rPr lang="en-US" dirty="0" smtClean="0"/>
+              <a:t>same problem as for the cards…</a:t>
             </a:r>
           </a:p>
         </p:txBody>
@@ -11588,7 +11687,7 @@
         <p:spPr>
           <a:xfrm>
             <a:off x="457200" y="228600"/>
-            <a:ext cx="4708853" cy="369332"/>
+            <a:ext cx="5184946" cy="369332"/>
           </a:xfrm>
           <a:prstGeom prst="rect">
             <a:avLst/>
@@ -11603,13 +11702,17 @@
           <a:p>
             <a:r>
               <a:rPr lang="en-US" dirty="0" smtClean="0"/>
-              <a:t>This simulation code is up at the class </a:t>
+              <a:t>This simulation code is up at the </a:t>
             </a:r>
             <a:r>
               <a:rPr lang="en-US" smtClean="0"/>
+              <a:t>(old) class </a:t>
+            </a:r>
+            <a:r>
+              <a:rPr lang="en-US" dirty="0" smtClean="0"/>
               <a:t>web site…</a:t>
             </a:r>
-            <a:endParaRPr lang="en-US"/>
+            <a:endParaRPr lang="en-US" dirty="0"/>
           </a:p>
         </p:txBody>
       </p:sp>

</xml_diff>